<commit_message>
Modifications défense vraie fin
</commit_message>
<xml_diff>
--- a/Automatisation des déploiements d’applications et d’équipements réseaux via.pptx
+++ b/Automatisation des déploiements d’applications et d’équipements réseaux via.pptx
@@ -321,7 +321,7 @@
           <a:p>
             <a:fld id="{3EDF3FFF-8697-4D76-BBA4-6FCA23460B13}" type="datetimeFigureOut">
               <a:rPr lang="fr-BE" smtClean="0"/>
-              <a:t>10-06-17</a:t>
+              <a:t>11-06-17</a:t>
             </a:fld>
             <a:endParaRPr lang="fr-BE"/>
           </a:p>
@@ -647,6 +647,13 @@
               <a:rPr lang="fr-BE" dirty="0"/>
               <a:t>Attention application = applications générale != software</a:t>
             </a:r>
+          </a:p>
+          <a:p>
+            <a:r>
+              <a:rPr lang="en-GB" dirty="0"/>
+              <a:t>Yet Another Software Configurator</a:t>
+            </a:r>
+            <a:endParaRPr lang="fr-BE" dirty="0"/>
           </a:p>
         </p:txBody>
       </p:sp>

</xml_diff>